<commit_message>
Updated admin objects lesson, added app builder data modeling lesson, and added app builder fundamentals lesson links.
</commit_message>
<xml_diff>
--- a/data/admin/objects/pages.pptx
+++ b/data/admin/objects/pages.pptx
@@ -202,7 +202,7 @@
           <a:p>
             <a:fld id="{148A6914-CB7E-432F-9F4B-CC7F37DC0438}" type="datetimeFigureOut">
               <a:rPr lang="en-US" smtClean="0"/>
-              <a:t>10/8/2021</a:t>
+              <a:t>10/15/2021</a:t>
             </a:fld>
             <a:endParaRPr lang="en-US"/>
           </a:p>
@@ -684,7 +684,7 @@
           <a:p>
             <a:fld id="{C35190AA-E4B7-45C6-A812-1637583B9BF7}" type="datetimeFigureOut">
               <a:rPr lang="en-US" smtClean="0"/>
-              <a:t>10/8/2021</a:t>
+              <a:t>10/15/2021</a:t>
             </a:fld>
             <a:endParaRPr lang="en-US"/>
           </a:p>
@@ -854,7 +854,7 @@
           <a:p>
             <a:fld id="{C35190AA-E4B7-45C6-A812-1637583B9BF7}" type="datetimeFigureOut">
               <a:rPr lang="en-US" smtClean="0"/>
-              <a:t>10/8/2021</a:t>
+              <a:t>10/15/2021</a:t>
             </a:fld>
             <a:endParaRPr lang="en-US"/>
           </a:p>
@@ -1034,7 +1034,7 @@
           <a:p>
             <a:fld id="{C35190AA-E4B7-45C6-A812-1637583B9BF7}" type="datetimeFigureOut">
               <a:rPr lang="en-US" smtClean="0"/>
-              <a:t>10/8/2021</a:t>
+              <a:t>10/15/2021</a:t>
             </a:fld>
             <a:endParaRPr lang="en-US"/>
           </a:p>
@@ -1204,7 +1204,7 @@
           <a:p>
             <a:fld id="{C35190AA-E4B7-45C6-A812-1637583B9BF7}" type="datetimeFigureOut">
               <a:rPr lang="en-US" smtClean="0"/>
-              <a:t>10/8/2021</a:t>
+              <a:t>10/15/2021</a:t>
             </a:fld>
             <a:endParaRPr lang="en-US"/>
           </a:p>
@@ -1448,7 +1448,7 @@
           <a:p>
             <a:fld id="{C35190AA-E4B7-45C6-A812-1637583B9BF7}" type="datetimeFigureOut">
               <a:rPr lang="en-US" smtClean="0"/>
-              <a:t>10/8/2021</a:t>
+              <a:t>10/15/2021</a:t>
             </a:fld>
             <a:endParaRPr lang="en-US"/>
           </a:p>
@@ -1680,7 +1680,7 @@
           <a:p>
             <a:fld id="{C35190AA-E4B7-45C6-A812-1637583B9BF7}" type="datetimeFigureOut">
               <a:rPr lang="en-US" smtClean="0"/>
-              <a:t>10/8/2021</a:t>
+              <a:t>10/15/2021</a:t>
             </a:fld>
             <a:endParaRPr lang="en-US"/>
           </a:p>
@@ -2047,7 +2047,7 @@
           <a:p>
             <a:fld id="{C35190AA-E4B7-45C6-A812-1637583B9BF7}" type="datetimeFigureOut">
               <a:rPr lang="en-US" smtClean="0"/>
-              <a:t>10/8/2021</a:t>
+              <a:t>10/15/2021</a:t>
             </a:fld>
             <a:endParaRPr lang="en-US"/>
           </a:p>
@@ -2165,7 +2165,7 @@
           <a:p>
             <a:fld id="{C35190AA-E4B7-45C6-A812-1637583B9BF7}" type="datetimeFigureOut">
               <a:rPr lang="en-US" smtClean="0"/>
-              <a:t>10/8/2021</a:t>
+              <a:t>10/15/2021</a:t>
             </a:fld>
             <a:endParaRPr lang="en-US"/>
           </a:p>
@@ -2260,7 +2260,7 @@
           <a:p>
             <a:fld id="{C35190AA-E4B7-45C6-A812-1637583B9BF7}" type="datetimeFigureOut">
               <a:rPr lang="en-US" smtClean="0"/>
-              <a:t>10/8/2021</a:t>
+              <a:t>10/15/2021</a:t>
             </a:fld>
             <a:endParaRPr lang="en-US"/>
           </a:p>
@@ -2537,7 +2537,7 @@
           <a:p>
             <a:fld id="{C35190AA-E4B7-45C6-A812-1637583B9BF7}" type="datetimeFigureOut">
               <a:rPr lang="en-US" smtClean="0"/>
-              <a:t>10/8/2021</a:t>
+              <a:t>10/15/2021</a:t>
             </a:fld>
             <a:endParaRPr lang="en-US"/>
           </a:p>
@@ -2794,7 +2794,7 @@
           <a:p>
             <a:fld id="{C35190AA-E4B7-45C6-A812-1637583B9BF7}" type="datetimeFigureOut">
               <a:rPr lang="en-US" smtClean="0"/>
-              <a:t>10/8/2021</a:t>
+              <a:t>10/15/2021</a:t>
             </a:fld>
             <a:endParaRPr lang="en-US"/>
           </a:p>
@@ -3007,7 +3007,7 @@
           <a:p>
             <a:fld id="{C35190AA-E4B7-45C6-A812-1637583B9BF7}" type="datetimeFigureOut">
               <a:rPr lang="en-US" smtClean="0"/>
-              <a:t>10/8/2021</a:t>
+              <a:t>10/15/2021</a:t>
             </a:fld>
             <a:endParaRPr lang="en-US"/>
           </a:p>
@@ -3427,7 +3427,7 @@
         <p:spPr>
           <a:xfrm>
             <a:off x="386623" y="1508831"/>
-            <a:ext cx="6540500" cy="5833135"/>
+            <a:ext cx="6540500" cy="8014502"/>
           </a:xfrm>
           <a:prstGeom prst="rect">
             <a:avLst/>
@@ -3779,7 +3779,7 @@
                 <a:ea typeface="Times" panose="02020603050405020304" pitchFamily="18" charset="0"/>
                 <a:cs typeface="Times" panose="02020603050405020304" pitchFamily="18" charset="0"/>
               </a:rPr>
-              <a:t>sharing and roll-up summary fields.</a:t>
+              <a:t>sharing, deletion, and roll-up summary fields.</a:t>
             </a:r>
             <a:endParaRPr lang="en-US" sz="1050" dirty="0">
               <a:solidFill>
@@ -3808,7 +3808,7 @@
                 <a:ea typeface="Times" panose="02020603050405020304" pitchFamily="18" charset="0"/>
                 <a:cs typeface="Times" panose="02020603050405020304" pitchFamily="18" charset="0"/>
               </a:rPr>
-              <a:t>Lookup: Loose link that allows viewing and easy access to related records.</a:t>
+              <a:t>Lookup: Loose link that allows viewing and easy access to related records as well as reporting on related objects in a single report.</a:t>
             </a:r>
           </a:p>
           <a:p>
@@ -3947,7 +3947,7 @@
                 <a:ea typeface="Times" panose="02020603050405020304" pitchFamily="18" charset="0"/>
                 <a:cs typeface="Times" panose="02020603050405020304" pitchFamily="18" charset="0"/>
               </a:rPr>
-              <a:t>Object record types can define different picklist values, page layouts, and business processes.</a:t>
+              <a:t>Schema Builder is a tool in Setup to visually edit data models and view object relationships.</a:t>
             </a:r>
           </a:p>
           <a:p>
@@ -3965,7 +3965,25 @@
                 <a:ea typeface="Times" panose="02020603050405020304" pitchFamily="18" charset="0"/>
                 <a:cs typeface="Times" panose="02020603050405020304" pitchFamily="18" charset="0"/>
               </a:rPr>
-              <a:t>Record types can be assigned via profiles or permission sets.</a:t>
+              <a:t>Can quickly create objects, supported fields, and relationships but cannot edit page layouts.</a:t>
+            </a:r>
+          </a:p>
+          <a:p>
+            <a:pPr marL="457200" lvl="2" indent="-171450">
+              <a:lnSpc>
+                <a:spcPct val="150000"/>
+              </a:lnSpc>
+            </a:pPr>
+            <a:r>
+              <a:rPr lang="en-US" sz="1050" dirty="0">
+                <a:solidFill>
+                  <a:srgbClr val="000000"/>
+                </a:solidFill>
+                <a:latin typeface="Avenir Next LT Pro" panose="020B0504020202020204" pitchFamily="34" charset="0"/>
+                <a:ea typeface="Times" panose="02020603050405020304" pitchFamily="18" charset="0"/>
+                <a:cs typeface="Times" panose="02020603050405020304" pitchFamily="18" charset="0"/>
+              </a:rPr>
+              <a:t>=&gt; New fields must be added to page layouts separately</a:t>
             </a:r>
           </a:p>
           <a:p>
@@ -3998,7 +4016,127 @@
                 <a:ea typeface="Times" panose="02020603050405020304" pitchFamily="18" charset="0"/>
                 <a:cs typeface="Times" panose="02020603050405020304" pitchFamily="18" charset="0"/>
               </a:rPr>
-              <a:t>An app is a collection of tabs and access can be granted via profiles.</a:t>
+              <a:t>Object record types can define different picklist values, page layouts, and business processes.</a:t>
+            </a:r>
+          </a:p>
+          <a:p>
+            <a:pPr marL="0" lvl="1" indent="-171450">
+              <a:lnSpc>
+                <a:spcPct val="150000"/>
+              </a:lnSpc>
+            </a:pPr>
+            <a:r>
+              <a:rPr lang="en-US" sz="1050" dirty="0">
+                <a:solidFill>
+                  <a:srgbClr val="000000"/>
+                </a:solidFill>
+                <a:latin typeface="Avenir Next LT Pro" panose="020B0504020202020204" pitchFamily="34" charset="0"/>
+                <a:ea typeface="Times" panose="02020603050405020304" pitchFamily="18" charset="0"/>
+                <a:cs typeface="Times" panose="02020603050405020304" pitchFamily="18" charset="0"/>
+              </a:rPr>
+              <a:t>Record types can be assigned via profiles or permission sets.</a:t>
+            </a:r>
+          </a:p>
+          <a:p>
+            <a:pPr marL="0" lvl="1" indent="-171450">
+              <a:lnSpc>
+                <a:spcPct val="150000"/>
+              </a:lnSpc>
+            </a:pPr>
+            <a:endParaRPr lang="en-US" sz="1050" dirty="0">
+              <a:solidFill>
+                <a:srgbClr val="000000"/>
+              </a:solidFill>
+              <a:latin typeface="Avenir Next LT Pro" panose="020B0504020202020204" pitchFamily="34" charset="0"/>
+              <a:ea typeface="Times" panose="02020603050405020304" pitchFamily="18" charset="0"/>
+              <a:cs typeface="Times" panose="02020603050405020304" pitchFamily="18" charset="0"/>
+            </a:endParaRPr>
+          </a:p>
+          <a:p>
+            <a:pPr marL="0" lvl="1" indent="-171450">
+              <a:lnSpc>
+                <a:spcPct val="150000"/>
+              </a:lnSpc>
+            </a:pPr>
+            <a:r>
+              <a:rPr lang="en-US" sz="1050" dirty="0">
+                <a:solidFill>
+                  <a:srgbClr val="000000"/>
+                </a:solidFill>
+                <a:latin typeface="Avenir Next LT Pro" panose="020B0504020202020204" pitchFamily="34" charset="0"/>
+                <a:ea typeface="Times" panose="02020603050405020304" pitchFamily="18" charset="0"/>
+                <a:cs typeface="Times" panose="02020603050405020304" pitchFamily="18" charset="0"/>
+              </a:rPr>
+              <a:t>External objects do not support automation, sharing, or record types.</a:t>
+            </a:r>
+          </a:p>
+          <a:p>
+            <a:pPr marL="0" lvl="1" indent="-171450">
+              <a:lnSpc>
+                <a:spcPct val="150000"/>
+              </a:lnSpc>
+            </a:pPr>
+            <a:r>
+              <a:rPr lang="en-US" sz="1050" dirty="0">
+                <a:solidFill>
+                  <a:srgbClr val="000000"/>
+                </a:solidFill>
+                <a:latin typeface="Avenir Next LT Pro" panose="020B0504020202020204" pitchFamily="34" charset="0"/>
+                <a:ea typeface="Times" panose="02020603050405020304" pitchFamily="18" charset="0"/>
+                <a:cs typeface="Times" panose="02020603050405020304" pitchFamily="18" charset="0"/>
+              </a:rPr>
+              <a:t>External object reports do not support cross-filters, bucket fields, or historical trend reporting.</a:t>
+            </a:r>
+          </a:p>
+          <a:p>
+            <a:pPr marL="0" lvl="1" indent="-171450">
+              <a:lnSpc>
+                <a:spcPct val="150000"/>
+              </a:lnSpc>
+            </a:pPr>
+            <a:endParaRPr lang="en-US" sz="1050" dirty="0">
+              <a:solidFill>
+                <a:srgbClr val="000000"/>
+              </a:solidFill>
+              <a:latin typeface="Avenir Next LT Pro" panose="020B0504020202020204" pitchFamily="34" charset="0"/>
+              <a:ea typeface="Times" panose="02020603050405020304" pitchFamily="18" charset="0"/>
+              <a:cs typeface="Times" panose="02020603050405020304" pitchFamily="18" charset="0"/>
+            </a:endParaRPr>
+          </a:p>
+          <a:p>
+            <a:pPr marL="0" lvl="1" indent="-171450">
+              <a:lnSpc>
+                <a:spcPct val="150000"/>
+              </a:lnSpc>
+            </a:pPr>
+            <a:r>
+              <a:rPr lang="en-US" sz="1050" dirty="0">
+                <a:solidFill>
+                  <a:srgbClr val="000000"/>
+                </a:solidFill>
+                <a:latin typeface="Avenir Next LT Pro" panose="020B0504020202020204" pitchFamily="34" charset="0"/>
+                <a:ea typeface="Times" panose="02020603050405020304" pitchFamily="18" charset="0"/>
+                <a:cs typeface="Times" panose="02020603050405020304" pitchFamily="18" charset="0"/>
+              </a:rPr>
+              <a:t>SF Connect allows integration with external data to provide real-time access using web service callouts.</a:t>
+            </a:r>
+          </a:p>
+          <a:p>
+            <a:pPr marL="0" lvl="1" indent="-171450">
+              <a:lnSpc>
+                <a:spcPct val="150000"/>
+              </a:lnSpc>
+            </a:pPr>
+            <a:r>
+              <a:rPr lang="en-US" sz="1050" dirty="0">
+                <a:solidFill>
+                  <a:srgbClr val="000000"/>
+                </a:solidFill>
+                <a:latin typeface="Avenir Next LT Pro" panose="020B0504020202020204" pitchFamily="34" charset="0"/>
+                <a:ea typeface="Times" panose="02020603050405020304" pitchFamily="18" charset="0"/>
+                <a:cs typeface="Times" panose="02020603050405020304" pitchFamily="18" charset="0"/>
+              </a:rPr>
+              <a:t>Source data must comply with the Open Data Protocol and is not copied or stored in Salesforce.</a:t>
             </a:r>
           </a:p>
         </p:txBody>
@@ -4083,7 +4221,7 @@
         <p:spPr>
           <a:xfrm>
             <a:off x="387348" y="1508831"/>
-            <a:ext cx="6540500" cy="5106013"/>
+            <a:ext cx="6540500" cy="6802631"/>
           </a:xfrm>
           <a:prstGeom prst="rect">
             <a:avLst/>
@@ -4468,7 +4606,127 @@
                 <a:ea typeface="Times" panose="02020603050405020304" pitchFamily="18" charset="0"/>
                 <a:cs typeface="Times" panose="02020603050405020304" pitchFamily="18" charset="0"/>
               </a:rPr>
-              <a:t>Changing the data type of a field can result in loss of data between certain types and should be pursued with care.</a:t>
+              <a:t>Formula fields are read-only and automatically calculate a value from other fields.</a:t>
+            </a:r>
+          </a:p>
+          <a:p>
+            <a:pPr indent="-171450">
+              <a:lnSpc>
+                <a:spcPct val="150000"/>
+              </a:lnSpc>
+            </a:pPr>
+            <a:r>
+              <a:rPr lang="en-US" sz="1050" dirty="0">
+                <a:solidFill>
+                  <a:srgbClr val="000000"/>
+                </a:solidFill>
+                <a:latin typeface="Avenir Next LT Pro" panose="020B0504020202020204" pitchFamily="34" charset="0"/>
+                <a:ea typeface="Times" panose="02020603050405020304" pitchFamily="18" charset="0"/>
+                <a:cs typeface="Times" panose="02020603050405020304" pitchFamily="18" charset="0"/>
+              </a:rPr>
+              <a:t>Can specify a return data type and can be cross-object to reference lookup or master objects.</a:t>
+            </a:r>
+          </a:p>
+          <a:p>
+            <a:pPr indent="-171450">
+              <a:lnSpc>
+                <a:spcPct val="150000"/>
+              </a:lnSpc>
+            </a:pPr>
+            <a:endParaRPr lang="en-US" sz="1050" dirty="0">
+              <a:solidFill>
+                <a:srgbClr val="000000"/>
+              </a:solidFill>
+              <a:latin typeface="Avenir Next LT Pro" panose="020B0504020202020204" pitchFamily="34" charset="0"/>
+              <a:ea typeface="Times" panose="02020603050405020304" pitchFamily="18" charset="0"/>
+              <a:cs typeface="Times" panose="02020603050405020304" pitchFamily="18" charset="0"/>
+            </a:endParaRPr>
+          </a:p>
+          <a:p>
+            <a:pPr indent="-171450">
+              <a:lnSpc>
+                <a:spcPct val="150000"/>
+              </a:lnSpc>
+            </a:pPr>
+            <a:r>
+              <a:rPr lang="en-US" sz="1050" dirty="0">
+                <a:solidFill>
+                  <a:srgbClr val="000000"/>
+                </a:solidFill>
+                <a:latin typeface="Avenir Next LT Pro" panose="020B0504020202020204" pitchFamily="34" charset="0"/>
+                <a:ea typeface="Times" panose="02020603050405020304" pitchFamily="18" charset="0"/>
+                <a:cs typeface="Times" panose="02020603050405020304" pitchFamily="18" charset="0"/>
+              </a:rPr>
+              <a:t>Roll-Up Summary fields are read-only and calculate a value on a master object from detail objects.</a:t>
+            </a:r>
+          </a:p>
+          <a:p>
+            <a:pPr indent="-171450">
+              <a:lnSpc>
+                <a:spcPct val="150000"/>
+              </a:lnSpc>
+            </a:pPr>
+            <a:r>
+              <a:rPr lang="en-US" sz="1050" dirty="0">
+                <a:solidFill>
+                  <a:srgbClr val="000000"/>
+                </a:solidFill>
+                <a:latin typeface="Avenir Next LT Pro" panose="020B0504020202020204" pitchFamily="34" charset="0"/>
+                <a:ea typeface="Times" panose="02020603050405020304" pitchFamily="18" charset="0"/>
+                <a:cs typeface="Times" panose="02020603050405020304" pitchFamily="18" charset="0"/>
+              </a:rPr>
+              <a:t>Operators are Count, Sum, Min, and Max and are recalculated when  detail object is saved.</a:t>
+            </a:r>
+          </a:p>
+          <a:p>
+            <a:pPr indent="-171450">
+              <a:lnSpc>
+                <a:spcPct val="150000"/>
+              </a:lnSpc>
+            </a:pPr>
+            <a:endParaRPr lang="en-US" sz="1050" dirty="0">
+              <a:solidFill>
+                <a:srgbClr val="000000"/>
+              </a:solidFill>
+              <a:latin typeface="Avenir Next LT Pro" panose="020B0504020202020204" pitchFamily="34" charset="0"/>
+              <a:ea typeface="Times" panose="02020603050405020304" pitchFamily="18" charset="0"/>
+              <a:cs typeface="Times" panose="02020603050405020304" pitchFamily="18" charset="0"/>
+            </a:endParaRPr>
+          </a:p>
+          <a:p>
+            <a:pPr indent="-171450">
+              <a:lnSpc>
+                <a:spcPct val="150000"/>
+              </a:lnSpc>
+            </a:pPr>
+            <a:r>
+              <a:rPr lang="en-US" sz="1050" dirty="0">
+                <a:solidFill>
+                  <a:srgbClr val="000000"/>
+                </a:solidFill>
+                <a:latin typeface="Avenir Next LT Pro" panose="020B0504020202020204" pitchFamily="34" charset="0"/>
+                <a:ea typeface="Times" panose="02020603050405020304" pitchFamily="18" charset="0"/>
+                <a:cs typeface="Times" panose="02020603050405020304" pitchFamily="18" charset="0"/>
+              </a:rPr>
+              <a:t>Changing the data type of a field can result in loss of data between certain types and should be pursued with care and appropriate data backup.</a:t>
+            </a:r>
+          </a:p>
+          <a:p>
+            <a:pPr indent="-171450">
+              <a:lnSpc>
+                <a:spcPct val="150000"/>
+              </a:lnSpc>
+            </a:pPr>
+            <a:r>
+              <a:rPr lang="en-US" sz="1050" dirty="0">
+                <a:solidFill>
+                  <a:srgbClr val="000000"/>
+                </a:solidFill>
+                <a:latin typeface="Avenir Next LT Pro" panose="020B0504020202020204" pitchFamily="34" charset="0"/>
+                <a:ea typeface="Times" panose="02020603050405020304" pitchFamily="18" charset="0"/>
+                <a:cs typeface="Times" panose="02020603050405020304" pitchFamily="18" charset="0"/>
+              </a:rPr>
+              <a:t>Only the data types of custom fields can be converted.</a:t>
             </a:r>
           </a:p>
           <a:p>
@@ -4621,7 +4879,7 @@
         <p:spPr>
           <a:xfrm>
             <a:off x="386623" y="1508831"/>
-            <a:ext cx="6540500" cy="4378891"/>
+            <a:ext cx="6540500" cy="4863639"/>
           </a:xfrm>
           <a:prstGeom prst="rect">
             <a:avLst/>
@@ -4730,6 +4988,45 @@
                 <a:srgbClr val="000000"/>
               </a:solidFill>
               <a:effectLst/>
+              <a:latin typeface="Avenir Next LT Pro" panose="020B0504020202020204" pitchFamily="34" charset="0"/>
+              <a:ea typeface="Times" panose="02020603050405020304" pitchFamily="18" charset="0"/>
+              <a:cs typeface="Times" panose="02020603050405020304" pitchFamily="18" charset="0"/>
+            </a:endParaRPr>
+          </a:p>
+          <a:p>
+            <a:pPr marL="0" lvl="1" indent="-171450">
+              <a:lnSpc>
+                <a:spcPct val="150000"/>
+              </a:lnSpc>
+            </a:pPr>
+            <a:r>
+              <a:rPr lang="en-US" sz="1050" dirty="0">
+                <a:solidFill>
+                  <a:srgbClr val="000000"/>
+                </a:solidFill>
+                <a:latin typeface="Avenir Next LT Pro" panose="020B0504020202020204" pitchFamily="34" charset="0"/>
+                <a:ea typeface="Times" panose="02020603050405020304" pitchFamily="18" charset="0"/>
+                <a:cs typeface="Times" panose="02020603050405020304" pitchFamily="18" charset="0"/>
+              </a:rPr>
+              <a:t>An app is a collection of tabs and access can be granted via profiles.</a:t>
+            </a:r>
+          </a:p>
+          <a:p>
+            <a:pPr marL="0" marR="0">
+              <a:lnSpc>
+                <a:spcPct val="150000"/>
+              </a:lnSpc>
+              <a:spcBef>
+                <a:spcPts val="0"/>
+              </a:spcBef>
+              <a:spcAft>
+                <a:spcPts val="0"/>
+              </a:spcAft>
+            </a:pPr>
+            <a:endParaRPr lang="en-US" sz="1050" dirty="0">
+              <a:solidFill>
+                <a:srgbClr val="000000"/>
+              </a:solidFill>
               <a:latin typeface="Avenir Next LT Pro" panose="020B0504020202020204" pitchFamily="34" charset="0"/>
               <a:ea typeface="Times" panose="02020603050405020304" pitchFamily="18" charset="0"/>
               <a:cs typeface="Times" panose="02020603050405020304" pitchFamily="18" charset="0"/>

</xml_diff>